<commit_message>
add diagnostic html and uart reprot
</commit_message>
<xml_diff>
--- a/spi_report_ben.pptx
+++ b/spi_report_ben.pptx
@@ -5,10 +5,10 @@
     <p:sldMasterId id="2147483648" r:id="rId1"/>
   </p:sldMasterIdLst>
   <p:notesMasterIdLst>
-    <p:notesMasterId r:id="rId35"/>
+    <p:notesMasterId r:id="rId36"/>
   </p:notesMasterIdLst>
   <p:handoutMasterIdLst>
-    <p:handoutMasterId r:id="rId36"/>
+    <p:handoutMasterId r:id="rId37"/>
   </p:handoutMasterIdLst>
   <p:sldIdLst>
     <p:sldId id="256" r:id="rId2"/>
@@ -43,30 +43,31 @@
     <p:sldId id="314" r:id="rId31"/>
     <p:sldId id="258" r:id="rId32"/>
     <p:sldId id="290" r:id="rId33"/>
-    <p:sldId id="331" r:id="rId34"/>
+    <p:sldId id="350" r:id="rId34"/>
+    <p:sldId id="331" r:id="rId35"/>
   </p:sldIdLst>
   <p:sldSz cx="9144000" cy="5715000" type="screen16x10"/>
   <p:notesSz cx="6858000" cy="9144000"/>
   <p:embeddedFontLst>
     <p:embeddedFont>
       <p:font typeface="Futura Bk BT"/>
-      <p:regular r:id="rId37"/>
+      <p:regular r:id="rId38"/>
     </p:embeddedFont>
     <p:embeddedFont>
       <p:font typeface="Arial Unicode MS" pitchFamily="34" charset="-120"/>
-      <p:regular r:id="rId38"/>
+      <p:regular r:id="rId39"/>
     </p:embeddedFont>
     <p:embeddedFont>
       <p:font typeface="微軟正黑體" pitchFamily="34" charset="-120"/>
-      <p:regular r:id="rId39"/>
-      <p:bold r:id="rId40"/>
+      <p:regular r:id="rId40"/>
+      <p:bold r:id="rId41"/>
     </p:embeddedFont>
     <p:embeddedFont>
       <p:font typeface="Calibri" pitchFamily="34" charset="0"/>
-      <p:regular r:id="rId41"/>
-      <p:bold r:id="rId42"/>
-      <p:italic r:id="rId43"/>
-      <p:boldItalic r:id="rId44"/>
+      <p:regular r:id="rId42"/>
+      <p:bold r:id="rId43"/>
+      <p:italic r:id="rId44"/>
+      <p:boldItalic r:id="rId45"/>
     </p:embeddedFont>
   </p:embeddedFontLst>
   <p:defaultTextStyle>
@@ -250,7 +251,7 @@
             <a:fld id="{325154A4-CA18-43B2-977D-6DF08BA83A3D}" type="datetimeFigureOut">
               <a:rPr lang="zh-TW" altLang="en-US" smtClean="0"/>
               <a:pPr/>
-              <a:t>2015/11/6</a:t>
+              <a:t>2015/11/9</a:t>
             </a:fld>
             <a:endParaRPr lang="zh-TW" altLang="en-US"/>
           </a:p>
@@ -326,7 +327,7 @@
     </p:spTree>
     <p:extLst>
       <p:ext uri="{BB962C8B-B14F-4D97-AF65-F5344CB8AC3E}">
-        <p14:creationId xmlns:p14="http://schemas.microsoft.com/office/powerpoint/2010/main" xmlns="" val="1745725823"/>
+        <p14:creationId xmlns="" xmlns:p14="http://schemas.microsoft.com/office/powerpoint/2010/main" val="1745725823"/>
       </p:ext>
     </p:extLst>
   </p:cSld>
@@ -417,7 +418,7 @@
             <a:fld id="{956157D8-F6D7-4F1C-8521-742A313DD9E2}" type="datetimeFigureOut">
               <a:rPr lang="zh-TW" altLang="en-US" smtClean="0"/>
               <a:pPr/>
-              <a:t>2015/11/6</a:t>
+              <a:t>2015/11/9</a:t>
             </a:fld>
             <a:endParaRPr lang="zh-TW" altLang="en-US"/>
           </a:p>
@@ -588,7 +589,7 @@
     </p:spTree>
     <p:extLst>
       <p:ext uri="{BB962C8B-B14F-4D97-AF65-F5344CB8AC3E}">
-        <p14:creationId xmlns:p14="http://schemas.microsoft.com/office/powerpoint/2010/main" xmlns="" val="3871340698"/>
+        <p14:creationId xmlns="" xmlns:p14="http://schemas.microsoft.com/office/powerpoint/2010/main" val="3871340698"/>
       </p:ext>
     </p:extLst>
   </p:cSld>
@@ -1045,7 +1046,7 @@
             <a:fld id="{AF8DC78C-5E18-4B5E-A3A5-B4400BC2AE47}" type="slidenum">
               <a:rPr lang="zh-TW" altLang="en-US" smtClean="0"/>
               <a:pPr/>
-              <a:t>33</a:t>
+              <a:t>34</a:t>
             </a:fld>
             <a:endParaRPr lang="zh-TW" altLang="en-US"/>
           </a:p>
@@ -2031,7 +2032,7 @@
           <a:blip r:embed="rId2" cstate="print">
             <a:extLst>
               <a:ext uri="{28A0092B-C50C-407E-A947-70E740481C1C}">
-                <a14:useLocalDpi xmlns:a14="http://schemas.microsoft.com/office/drawing/2010/main" xmlns="" val="0"/>
+                <a14:useLocalDpi xmlns="" xmlns:a14="http://schemas.microsoft.com/office/drawing/2010/main" val="0"/>
               </a:ext>
             </a:extLst>
           </a:blip>
@@ -2397,7 +2398,7 @@
     </p:spTree>
     <p:extLst>
       <p:ext uri="{BB962C8B-B14F-4D97-AF65-F5344CB8AC3E}">
-        <p14:creationId xmlns:p14="http://schemas.microsoft.com/office/powerpoint/2010/main" xmlns="" val="1604652190"/>
+        <p14:creationId xmlns="" xmlns:p14="http://schemas.microsoft.com/office/powerpoint/2010/main" val="1604652190"/>
       </p:ext>
     </p:extLst>
   </p:cSld>
@@ -2443,7 +2444,7 @@
           <a:blip r:embed="rId2" cstate="print">
             <a:extLst>
               <a:ext uri="{28A0092B-C50C-407E-A947-70E740481C1C}">
-                <a14:useLocalDpi xmlns:a14="http://schemas.microsoft.com/office/drawing/2010/main" xmlns="" val="0"/>
+                <a14:useLocalDpi xmlns="" xmlns:a14="http://schemas.microsoft.com/office/drawing/2010/main" val="0"/>
               </a:ext>
             </a:extLst>
           </a:blip>
@@ -2531,7 +2532,7 @@
     </p:spTree>
     <p:extLst>
       <p:ext uri="{BB962C8B-B14F-4D97-AF65-F5344CB8AC3E}">
-        <p14:creationId xmlns:p14="http://schemas.microsoft.com/office/powerpoint/2010/main" xmlns="" val="3828523544"/>
+        <p14:creationId xmlns="" xmlns:p14="http://schemas.microsoft.com/office/powerpoint/2010/main" val="3828523544"/>
       </p:ext>
     </p:extLst>
   </p:cSld>
@@ -5486,7 +5487,7 @@
           <a:blip r:embed="rId10" cstate="print">
             <a:extLst>
               <a:ext uri="{28A0092B-C50C-407E-A947-70E740481C1C}">
-                <a14:useLocalDpi xmlns:a14="http://schemas.microsoft.com/office/drawing/2010/main" xmlns="" val="0"/>
+                <a14:useLocalDpi xmlns="" xmlns:a14="http://schemas.microsoft.com/office/drawing/2010/main" val="0"/>
               </a:ext>
             </a:extLst>
           </a:blip>
@@ -6185,7 +6186,7 @@
                 <a:tabLst/>
                 <a:defRPr/>
               </a:pPr>
-              <a:t>2015/11/6</a:t>
+              <a:t>2015/11/9</a:t>
             </a:fld>
             <a:endParaRPr kumimoji="0" lang="zh-TW" altLang="en-US" sz="1050" b="0" i="0" u="none" strike="noStrike" kern="1200" cap="none" spc="0" normalizeH="0" baseline="0" noProof="0" dirty="0">
               <a:ln>
@@ -6210,7 +6211,7 @@
     </p:spTree>
     <p:extLst>
       <p:ext uri="{BB962C8B-B14F-4D97-AF65-F5344CB8AC3E}">
-        <p14:creationId xmlns:p14="http://schemas.microsoft.com/office/powerpoint/2010/main" xmlns="" val="495258064"/>
+        <p14:creationId xmlns="" xmlns:p14="http://schemas.microsoft.com/office/powerpoint/2010/main" val="495258064"/>
       </p:ext>
     </p:extLst>
   </p:cSld>
@@ -6394,22 +6395,14 @@
             </a:r>
             <a:r>
               <a:rPr lang="zh-TW" altLang="en-US" sz="1200" dirty="0" smtClean="0"/>
-              <a:t>進行處理，直到隊列變空為止</a:t>
-            </a:r>
+              <a:t>進行處理，直到隊列變空為止。</a:t>
+            </a:r>
+            <a:endParaRPr lang="en-US" altLang="zh-TW" sz="1200" dirty="0" smtClean="0"/>
+          </a:p>
+          <a:p>
             <a:r>
               <a:rPr lang="zh-TW" altLang="en-US" sz="1200" dirty="0" smtClean="0"/>
-              <a:t>。</a:t>
-            </a:r>
-            <a:endParaRPr lang="en-US" altLang="zh-TW" sz="1200" dirty="0" smtClean="0"/>
-          </a:p>
-          <a:p>
-            <a:r>
-              <a:rPr lang="zh-TW" altLang="en-US" sz="1200" dirty="0" smtClean="0"/>
-              <a:t>線</a:t>
-            </a:r>
-            <a:r>
-              <a:rPr lang="zh-TW" altLang="en-US" sz="1200" dirty="0" smtClean="0"/>
-              <a:t>程</a:t>
+              <a:t>線程</a:t>
             </a:r>
             <a:r>
               <a:rPr lang="en-US" altLang="zh-TW" sz="1200" dirty="0" smtClean="0"/>
@@ -7691,7 +7684,7 @@
     </p:spTree>
     <p:extLst>
       <p:ext uri="{BB962C8B-B14F-4D97-AF65-F5344CB8AC3E}">
-        <p14:creationId xmlns:p14="http://schemas.microsoft.com/office/powerpoint/2010/main" xmlns="" val="1188013231"/>
+        <p14:creationId xmlns="" xmlns:p14="http://schemas.microsoft.com/office/powerpoint/2010/main" val="1188013231"/>
       </p:ext>
     </p:extLst>
   </p:cSld>
@@ -8400,11 +8393,7 @@
             <a:pPr algn="ctr"/>
             <a:r>
               <a:rPr lang="en-US" altLang="zh-TW" sz="800" dirty="0" smtClean="0"/>
-              <a:t>control state </a:t>
-            </a:r>
-            <a:r>
-              <a:rPr lang="en-US" altLang="zh-TW" sz="800" dirty="0" smtClean="0"/>
-              <a:t>machine</a:t>
+              <a:t>control state machine</a:t>
             </a:r>
           </a:p>
           <a:p>
@@ -9291,7 +9280,6 @@
               <a:rPr lang="en-US" altLang="zh-TW" sz="800" dirty="0" smtClean="0"/>
               <a:t>Interface</a:t>
             </a:r>
-            <a:endParaRPr lang="en-US" altLang="zh-TW" sz="800" dirty="0" smtClean="0"/>
           </a:p>
         </p:txBody>
       </p:sp>
@@ -9433,22 +9421,14 @@
             </a:r>
             <a:r>
               <a:rPr lang="en-US" altLang="zh-TW" sz="800" dirty="0" smtClean="0"/>
-              <a:t> </a:t>
-            </a:r>
+              <a:t> core</a:t>
+            </a:r>
+          </a:p>
+          <a:p>
+            <a:pPr algn="ctr"/>
             <a:r>
               <a:rPr lang="en-US" altLang="zh-TW" sz="800" dirty="0" smtClean="0"/>
-              <a:t>core</a:t>
-            </a:r>
-          </a:p>
-          <a:p>
-            <a:pPr algn="ctr"/>
-            <a:r>
-              <a:rPr lang="en-US" altLang="zh-TW" sz="800" dirty="0" smtClean="0"/>
-              <a:t>control state </a:t>
-            </a:r>
-            <a:r>
-              <a:rPr lang="en-US" altLang="zh-TW" sz="800" dirty="0" smtClean="0"/>
-              <a:t>machine</a:t>
+              <a:t>control state machine</a:t>
             </a:r>
           </a:p>
           <a:p>
@@ -12620,7 +12600,6 @@
               <a:rPr lang="en-US" altLang="zh-TW" sz="800" b="1" dirty="0" smtClean="0"/>
               <a:t>Run Bit</a:t>
             </a:r>
-            <a:endParaRPr lang="en-US" altLang="zh-TW" sz="800" b="1" dirty="0" smtClean="0"/>
           </a:p>
         </p:txBody>
       </p:sp>
@@ -17168,7 +17147,7 @@
     </p:spTree>
     <p:extLst>
       <p:ext uri="{BB962C8B-B14F-4D97-AF65-F5344CB8AC3E}">
-        <p14:creationId xmlns="" xmlns:p14="http://schemas.microsoft.com/office/powerpoint/2010/main" val="3577142735"/>
+        <p14:creationId xmlns:p14="http://schemas.microsoft.com/office/powerpoint/2010/main" xmlns="" val="3577142735"/>
       </p:ext>
     </p:extLst>
   </p:cSld>
@@ -18248,7 +18227,7 @@
     </p:spTree>
     <p:extLst>
       <p:ext uri="{BB962C8B-B14F-4D97-AF65-F5344CB8AC3E}">
-        <p14:creationId xmlns:p14="http://schemas.microsoft.com/office/powerpoint/2010/main" xmlns="" val="1188013231"/>
+        <p14:creationId xmlns="" xmlns:p14="http://schemas.microsoft.com/office/powerpoint/2010/main" val="1188013231"/>
       </p:ext>
     </p:extLst>
   </p:cSld>
@@ -18331,7 +18310,7 @@
     </p:spTree>
     <p:extLst>
       <p:ext uri="{BB962C8B-B14F-4D97-AF65-F5344CB8AC3E}">
-        <p14:creationId xmlns:p14="http://schemas.microsoft.com/office/powerpoint/2010/main" xmlns="" val="1188013231"/>
+        <p14:creationId xmlns="" xmlns:p14="http://schemas.microsoft.com/office/powerpoint/2010/main" val="1188013231"/>
       </p:ext>
     </p:extLst>
   </p:cSld>
@@ -18431,7 +18410,7 @@
     </p:spTree>
     <p:extLst>
       <p:ext uri="{BB962C8B-B14F-4D97-AF65-F5344CB8AC3E}">
-        <p14:creationId xmlns:p14="http://schemas.microsoft.com/office/powerpoint/2010/main" xmlns="" val="553085013"/>
+        <p14:creationId xmlns="" xmlns:p14="http://schemas.microsoft.com/office/powerpoint/2010/main" val="553085013"/>
       </p:ext>
     </p:extLst>
   </p:cSld>
@@ -18562,6 +18541,101 @@
           <a:bodyPr/>
           <a:lstStyle/>
           <a:p>
+            <a:endParaRPr lang="zh-TW" altLang="en-US"/>
+          </a:p>
+        </p:txBody>
+      </p:sp>
+      <p:sp>
+        <p:nvSpPr>
+          <p:cNvPr id="3" name="標題 2"/>
+          <p:cNvSpPr>
+            <a:spLocks noGrp="1"/>
+          </p:cNvSpPr>
+          <p:nvPr>
+            <p:ph type="title"/>
+          </p:nvPr>
+        </p:nvSpPr>
+        <p:spPr/>
+        <p:txBody>
+          <a:bodyPr/>
+          <a:lstStyle/>
+          <a:p>
+            <a:endParaRPr lang="zh-TW" altLang="en-US"/>
+          </a:p>
+        </p:txBody>
+      </p:sp>
+      <p:pic>
+        <p:nvPicPr>
+          <p:cNvPr id="1026" name="Picture 2"/>
+          <p:cNvPicPr>
+            <a:picLocks noChangeAspect="1" noChangeArrowheads="1"/>
+          </p:cNvPicPr>
+          <p:nvPr/>
+        </p:nvPicPr>
+        <p:blipFill>
+          <a:blip r:embed="rId2" cstate="print"/>
+          <a:srcRect/>
+          <a:stretch>
+            <a:fillRect/>
+          </a:stretch>
+        </p:blipFill>
+        <p:spPr bwMode="auto">
+          <a:xfrm>
+            <a:off x="1485900" y="1609725"/>
+            <a:ext cx="6172200" cy="2495550"/>
+          </a:xfrm>
+          <a:prstGeom prst="rect">
+            <a:avLst/>
+          </a:prstGeom>
+          <a:noFill/>
+          <a:ln w="9525">
+            <a:noFill/>
+            <a:miter lim="800000"/>
+            <a:headEnd/>
+            <a:tailEnd/>
+          </a:ln>
+        </p:spPr>
+      </p:pic>
+    </p:spTree>
+  </p:cSld>
+  <p:clrMapOvr>
+    <a:masterClrMapping/>
+  </p:clrMapOvr>
+</p:sld>
+</file>
+
+<file path=ppt/slides/slide34.xml><?xml version="1.0" encoding="utf-8"?>
+<p:sld xmlns:a="http://schemas.openxmlformats.org/drawingml/2006/main" xmlns:r="http://schemas.openxmlformats.org/officeDocument/2006/relationships" xmlns:p="http://schemas.openxmlformats.org/presentationml/2006/main">
+  <p:cSld>
+    <p:spTree>
+      <p:nvGrpSpPr>
+        <p:cNvPr id="1" name=""/>
+        <p:cNvGrpSpPr/>
+        <p:nvPr/>
+      </p:nvGrpSpPr>
+      <p:grpSpPr>
+        <a:xfrm>
+          <a:off x="0" y="0"/>
+          <a:ext cx="0" cy="0"/>
+          <a:chOff x="0" y="0"/>
+          <a:chExt cx="0" cy="0"/>
+        </a:xfrm>
+      </p:grpSpPr>
+      <p:sp>
+        <p:nvSpPr>
+          <p:cNvPr id="2" name="內容版面配置區 1"/>
+          <p:cNvSpPr>
+            <a:spLocks noGrp="1"/>
+          </p:cNvSpPr>
+          <p:nvPr>
+            <p:ph sz="half" idx="2"/>
+          </p:nvPr>
+        </p:nvSpPr>
+        <p:spPr/>
+        <p:txBody>
+          <a:bodyPr/>
+          <a:lstStyle/>
+          <a:p>
             <a:r>
               <a:rPr lang="en-US" altLang="zh-TW" dirty="0" smtClean="0">
                 <a:hlinkClick r:id="rId3"/>
@@ -20417,7 +20491,7 @@
     </p:spTree>
     <p:extLst>
       <p:ext uri="{BB962C8B-B14F-4D97-AF65-F5344CB8AC3E}">
-        <p14:creationId xmlns:p14="http://schemas.microsoft.com/office/powerpoint/2010/main" xmlns="" val="1188013231"/>
+        <p14:creationId xmlns="" xmlns:p14="http://schemas.microsoft.com/office/powerpoint/2010/main" val="1188013231"/>
       </p:ext>
     </p:extLst>
   </p:cSld>
@@ -22872,7 +22946,7 @@
     </p:spTree>
     <p:extLst>
       <p:ext uri="{BB962C8B-B14F-4D97-AF65-F5344CB8AC3E}">
-        <p14:creationId xmlns:p14="http://schemas.microsoft.com/office/powerpoint/2010/main" xmlns="" val="2423379894"/>
+        <p14:creationId xmlns="" xmlns:p14="http://schemas.microsoft.com/office/powerpoint/2010/main" val="2423379894"/>
       </p:ext>
     </p:extLst>
   </p:cSld>
@@ -26319,7 +26393,7 @@
     </p:spTree>
     <p:extLst>
       <p:ext uri="{BB962C8B-B14F-4D97-AF65-F5344CB8AC3E}">
-        <p14:creationId xmlns:p14="http://schemas.microsoft.com/office/powerpoint/2010/main" xmlns="" val="1188013231"/>
+        <p14:creationId xmlns="" xmlns:p14="http://schemas.microsoft.com/office/powerpoint/2010/main" val="1188013231"/>
       </p:ext>
     </p:extLst>
   </p:cSld>
@@ -27721,7 +27795,7 @@
     </p:spTree>
     <p:extLst>
       <p:ext uri="{BB962C8B-B14F-4D97-AF65-F5344CB8AC3E}">
-        <p14:creationId xmlns:p14="http://schemas.microsoft.com/office/powerpoint/2010/main" xmlns="" val="2423379894"/>
+        <p14:creationId xmlns="" xmlns:p14="http://schemas.microsoft.com/office/powerpoint/2010/main" val="2423379894"/>
       </p:ext>
     </p:extLst>
   </p:cSld>

</xml_diff>

<commit_message>
add mdk user manual
</commit_message>
<xml_diff>
--- a/spi_report_ben.pptx
+++ b/spi_report_ben.pptx
@@ -250,7 +250,7 @@
             <a:fld id="{325154A4-CA18-43B2-977D-6DF08BA83A3D}" type="datetimeFigureOut">
               <a:rPr lang="zh-TW" altLang="en-US" smtClean="0"/>
               <a:pPr/>
-              <a:t>2015/11/18</a:t>
+              <a:t>2015/11/20</a:t>
             </a:fld>
             <a:endParaRPr lang="zh-TW" altLang="en-US"/>
           </a:p>
@@ -326,7 +326,7 @@
     </p:spTree>
     <p:extLst>
       <p:ext uri="{BB962C8B-B14F-4D97-AF65-F5344CB8AC3E}">
-        <p14:creationId xmlns="" xmlns:p14="http://schemas.microsoft.com/office/powerpoint/2010/main" val="1745725823"/>
+        <p14:creationId xmlns:p14="http://schemas.microsoft.com/office/powerpoint/2010/main" xmlns="" val="1745725823"/>
       </p:ext>
     </p:extLst>
   </p:cSld>
@@ -417,7 +417,7 @@
             <a:fld id="{956157D8-F6D7-4F1C-8521-742A313DD9E2}" type="datetimeFigureOut">
               <a:rPr lang="zh-TW" altLang="en-US" smtClean="0"/>
               <a:pPr/>
-              <a:t>2015/11/18</a:t>
+              <a:t>2015/11/20</a:t>
             </a:fld>
             <a:endParaRPr lang="zh-TW" altLang="en-US"/>
           </a:p>
@@ -588,7 +588,7 @@
     </p:spTree>
     <p:extLst>
       <p:ext uri="{BB962C8B-B14F-4D97-AF65-F5344CB8AC3E}">
-        <p14:creationId xmlns="" xmlns:p14="http://schemas.microsoft.com/office/powerpoint/2010/main" val="3871340698"/>
+        <p14:creationId xmlns:p14="http://schemas.microsoft.com/office/powerpoint/2010/main" xmlns="" val="3871340698"/>
       </p:ext>
     </p:extLst>
   </p:cSld>
@@ -2217,7 +2217,7 @@
           <a:blip r:embed="rId2" cstate="print">
             <a:extLst>
               <a:ext uri="{28A0092B-C50C-407E-A947-70E740481C1C}">
-                <a14:useLocalDpi xmlns="" xmlns:a14="http://schemas.microsoft.com/office/drawing/2010/main" val="0"/>
+                <a14:useLocalDpi xmlns:a14="http://schemas.microsoft.com/office/drawing/2010/main" xmlns="" val="0"/>
               </a:ext>
             </a:extLst>
           </a:blip>
@@ -2583,7 +2583,7 @@
     </p:spTree>
     <p:extLst>
       <p:ext uri="{BB962C8B-B14F-4D97-AF65-F5344CB8AC3E}">
-        <p14:creationId xmlns="" xmlns:p14="http://schemas.microsoft.com/office/powerpoint/2010/main" val="1604652190"/>
+        <p14:creationId xmlns:p14="http://schemas.microsoft.com/office/powerpoint/2010/main" xmlns="" val="1604652190"/>
       </p:ext>
     </p:extLst>
   </p:cSld>
@@ -2629,7 +2629,7 @@
           <a:blip r:embed="rId2" cstate="print">
             <a:extLst>
               <a:ext uri="{28A0092B-C50C-407E-A947-70E740481C1C}">
-                <a14:useLocalDpi xmlns="" xmlns:a14="http://schemas.microsoft.com/office/drawing/2010/main" val="0"/>
+                <a14:useLocalDpi xmlns:a14="http://schemas.microsoft.com/office/drawing/2010/main" xmlns="" val="0"/>
               </a:ext>
             </a:extLst>
           </a:blip>
@@ -2717,7 +2717,7 @@
     </p:spTree>
     <p:extLst>
       <p:ext uri="{BB962C8B-B14F-4D97-AF65-F5344CB8AC3E}">
-        <p14:creationId xmlns="" xmlns:p14="http://schemas.microsoft.com/office/powerpoint/2010/main" val="3828523544"/>
+        <p14:creationId xmlns:p14="http://schemas.microsoft.com/office/powerpoint/2010/main" xmlns="" val="3828523544"/>
       </p:ext>
     </p:extLst>
   </p:cSld>
@@ -5672,7 +5672,7 @@
           <a:blip r:embed="rId10" cstate="print">
             <a:extLst>
               <a:ext uri="{28A0092B-C50C-407E-A947-70E740481C1C}">
-                <a14:useLocalDpi xmlns="" xmlns:a14="http://schemas.microsoft.com/office/drawing/2010/main" val="0"/>
+                <a14:useLocalDpi xmlns:a14="http://schemas.microsoft.com/office/drawing/2010/main" xmlns="" val="0"/>
               </a:ext>
             </a:extLst>
           </a:blip>
@@ -6371,7 +6371,7 @@
                 <a:tabLst/>
                 <a:defRPr/>
               </a:pPr>
-              <a:t>2015/11/18</a:t>
+              <a:t>2015/11/20</a:t>
             </a:fld>
             <a:endParaRPr kumimoji="0" lang="zh-TW" altLang="en-US" sz="1050" b="0" i="0" u="none" strike="noStrike" kern="1200" cap="none" spc="0" normalizeH="0" baseline="0" noProof="0" dirty="0">
               <a:ln>
@@ -6396,7 +6396,7 @@
     </p:spTree>
     <p:extLst>
       <p:ext uri="{BB962C8B-B14F-4D97-AF65-F5344CB8AC3E}">
-        <p14:creationId xmlns="" xmlns:p14="http://schemas.microsoft.com/office/powerpoint/2010/main" val="495258064"/>
+        <p14:creationId xmlns:p14="http://schemas.microsoft.com/office/powerpoint/2010/main" xmlns="" val="495258064"/>
       </p:ext>
     </p:extLst>
   </p:cSld>
@@ -6470,7 +6470,11 @@
             </a:r>
             <a:r>
               <a:rPr lang="zh-TW" altLang="en-US" dirty="0" smtClean="0"/>
-              <a:t>隊列化</a:t>
+              <a:t>隊列</a:t>
+            </a:r>
+            <a:r>
+              <a:rPr lang="zh-TW" altLang="en-US" dirty="0" smtClean="0"/>
+              <a:t>化</a:t>
             </a:r>
             <a:endParaRPr lang="zh-TW" altLang="en-US" dirty="0"/>
           </a:p>
@@ -7173,11 +7177,7 @@
             </a:r>
             <a:r>
               <a:rPr lang="en-US" altLang="zh-TW" sz="800" dirty="0" smtClean="0"/>
-              <a:t>(master-</a:t>
-            </a:r>
-            <a:r>
-              <a:rPr lang="en-US" altLang="zh-TW" sz="800" dirty="0" smtClean="0"/>
-              <a:t>&gt;</a:t>
+              <a:t>(master-&gt;</a:t>
             </a:r>
             <a:r>
               <a:rPr lang="en-US" altLang="zh-TW" sz="800" dirty="0" err="1" smtClean="0"/>
@@ -10250,7 +10250,7 @@
     </p:spTree>
     <p:extLst>
       <p:ext uri="{BB962C8B-B14F-4D97-AF65-F5344CB8AC3E}">
-        <p14:creationId xmlns="" xmlns:p14="http://schemas.microsoft.com/office/powerpoint/2010/main" val="1188013231"/>
+        <p14:creationId xmlns:p14="http://schemas.microsoft.com/office/powerpoint/2010/main" xmlns="" val="1188013231"/>
       </p:ext>
     </p:extLst>
   </p:cSld>
@@ -10333,7 +10333,7 @@
     </p:spTree>
     <p:extLst>
       <p:ext uri="{BB962C8B-B14F-4D97-AF65-F5344CB8AC3E}">
-        <p14:creationId xmlns="" xmlns:p14="http://schemas.microsoft.com/office/powerpoint/2010/main" val="1188013231"/>
+        <p14:creationId xmlns:p14="http://schemas.microsoft.com/office/powerpoint/2010/main" xmlns="" val="1188013231"/>
       </p:ext>
     </p:extLst>
   </p:cSld>
@@ -19669,9 +19669,10 @@
           <a:lstStyle/>
           <a:p>
             <a:r>
-              <a:rPr lang="en-US" altLang="zh-TW" dirty="0" smtClean="0"/>
-              <a:t>I2C</a:t>
-            </a:r>
+              <a:rPr lang="en-US" altLang="zh-TW" smtClean="0"/>
+              <a:t>SPI</a:t>
+            </a:r>
+            <a:endParaRPr lang="en-US" altLang="zh-TW" dirty="0" smtClean="0"/>
           </a:p>
           <a:p>
             <a:pPr lvl="1"/>
@@ -19802,7 +19803,7 @@
     </p:spTree>
     <p:extLst>
       <p:ext uri="{BB962C8B-B14F-4D97-AF65-F5344CB8AC3E}">
-        <p14:creationId xmlns:p14="http://schemas.microsoft.com/office/powerpoint/2010/main" xmlns="" val="3577142735"/>
+        <p14:creationId xmlns="" xmlns:p14="http://schemas.microsoft.com/office/powerpoint/2010/main" val="3577142735"/>
       </p:ext>
     </p:extLst>
   </p:cSld>
@@ -20782,7 +20783,7 @@
     </p:spTree>
     <p:extLst>
       <p:ext uri="{BB962C8B-B14F-4D97-AF65-F5344CB8AC3E}">
-        <p14:creationId xmlns="" xmlns:p14="http://schemas.microsoft.com/office/powerpoint/2010/main" val="1188013231"/>
+        <p14:creationId xmlns:p14="http://schemas.microsoft.com/office/powerpoint/2010/main" xmlns="" val="1188013231"/>
       </p:ext>
     </p:extLst>
   </p:cSld>
@@ -20928,7 +20929,7 @@
     </p:spTree>
     <p:extLst>
       <p:ext uri="{BB962C8B-B14F-4D97-AF65-F5344CB8AC3E}">
-        <p14:creationId xmlns="" xmlns:p14="http://schemas.microsoft.com/office/powerpoint/2010/main" val="1188013231"/>
+        <p14:creationId xmlns:p14="http://schemas.microsoft.com/office/powerpoint/2010/main" xmlns="" val="1188013231"/>
       </p:ext>
     </p:extLst>
   </p:cSld>
@@ -20965,7 +20966,7 @@
     </p:spTree>
     <p:extLst>
       <p:ext uri="{BB962C8B-B14F-4D97-AF65-F5344CB8AC3E}">
-        <p14:creationId xmlns="" xmlns:p14="http://schemas.microsoft.com/office/powerpoint/2010/main" val="553085013"/>
+        <p14:creationId xmlns:p14="http://schemas.microsoft.com/office/powerpoint/2010/main" xmlns="" val="553085013"/>
       </p:ext>
     </p:extLst>
   </p:cSld>
@@ -21336,7 +21337,7 @@
           <a:p>
             <a:r>
               <a:rPr lang="en-US" altLang="zh-TW" dirty="0" smtClean="0"/>
-              <a:t>I2C </a:t>
+              <a:t>SPI </a:t>
             </a:r>
             <a:r>
               <a:rPr lang="zh-TW" altLang="en-US" dirty="0" smtClean="0"/>
@@ -23016,7 +23017,6 @@
               <a:rPr lang="en-US" altLang="zh-TW" dirty="0" smtClean="0"/>
               <a:t>Linux Device Driver – SPI</a:t>
             </a:r>
-            <a:endParaRPr lang="en-US" altLang="zh-TW" dirty="0" smtClean="0"/>
           </a:p>
         </p:txBody>
       </p:sp>
@@ -23047,7 +23047,7 @@
     </p:spTree>
     <p:extLst>
       <p:ext uri="{BB962C8B-B14F-4D97-AF65-F5344CB8AC3E}">
-        <p14:creationId xmlns="" xmlns:p14="http://schemas.microsoft.com/office/powerpoint/2010/main" val="1188013231"/>
+        <p14:creationId xmlns:p14="http://schemas.microsoft.com/office/powerpoint/2010/main" xmlns="" val="1188013231"/>
       </p:ext>
     </p:extLst>
   </p:cSld>
@@ -24895,13 +24895,7 @@
               <a:rPr lang="zh-TW" altLang="en-US" sz="1000" b="1" dirty="0" smtClean="0">
                 <a:latin typeface="+mn-ea"/>
               </a:rPr>
-              <a:t>內的各</a:t>
-            </a:r>
-            <a:r>
-              <a:rPr lang="zh-TW" altLang="en-US" sz="1000" b="1" dirty="0" smtClean="0">
-                <a:latin typeface="+mn-ea"/>
-              </a:rPr>
-              <a:t>組</a:t>
+              <a:t>內的各組</a:t>
             </a:r>
             <a:r>
               <a:rPr lang="en-US" altLang="zh-TW" sz="1000" b="1" dirty="0" smtClean="0">
@@ -25017,18 +25011,7 @@
                 </a:solidFill>
                 <a:latin typeface="+mn-ea"/>
               </a:rPr>
-              <a:t>適配</a:t>
-            </a:r>
-            <a:r>
-              <a:rPr lang="zh-TW" altLang="en-US" sz="1000" b="1" dirty="0" smtClean="0">
-                <a:solidFill>
-                  <a:schemeClr val="accent5">
-                    <a:lumMod val="75000"/>
-                  </a:schemeClr>
-                </a:solidFill>
-                <a:latin typeface="+mn-ea"/>
-              </a:rPr>
-              <a:t>器</a:t>
+              <a:t>適配器</a:t>
             </a:r>
             <a:endParaRPr lang="en-US" altLang="zh-TW" sz="1000" b="1" dirty="0" smtClean="0">
               <a:solidFill>
@@ -25313,7 +25296,7 @@
     </p:spTree>
     <p:extLst>
       <p:ext uri="{BB962C8B-B14F-4D97-AF65-F5344CB8AC3E}">
-        <p14:creationId xmlns="" xmlns:p14="http://schemas.microsoft.com/office/powerpoint/2010/main" val="2423379894"/>
+        <p14:creationId xmlns:p14="http://schemas.microsoft.com/office/powerpoint/2010/main" xmlns="" val="2423379894"/>
       </p:ext>
     </p:extLst>
   </p:cSld>
@@ -28730,7 +28713,6 @@
               <a:rPr lang="en-US" altLang="zh-TW" dirty="0" smtClean="0"/>
               <a:t>SPI bus driver</a:t>
             </a:r>
-            <a:endParaRPr lang="en-US" altLang="zh-TW" dirty="0" smtClean="0"/>
           </a:p>
         </p:txBody>
       </p:sp>
@@ -28761,7 +28743,7 @@
     </p:spTree>
     <p:extLst>
       <p:ext uri="{BB962C8B-B14F-4D97-AF65-F5344CB8AC3E}">
-        <p14:creationId xmlns="" xmlns:p14="http://schemas.microsoft.com/office/powerpoint/2010/main" val="1188013231"/>
+        <p14:creationId xmlns:p14="http://schemas.microsoft.com/office/powerpoint/2010/main" xmlns="" val="1188013231"/>
       </p:ext>
     </p:extLst>
   </p:cSld>

</xml_diff>